<commit_message>
updated the SCC prezo with OWID
</commit_message>
<xml_diff>
--- a/santa_clara_county/Historical_Public_Record_Presentation.pptx
+++ b/santa_clara_county/Historical_Public_Record_Presentation.pptx
@@ -9,9 +9,10 @@
     <p:sldId id="262" r:id="rId3"/>
     <p:sldId id="257" r:id="rId4"/>
     <p:sldId id="258" r:id="rId5"/>
-    <p:sldId id="259" r:id="rId6"/>
-    <p:sldId id="260" r:id="rId7"/>
-    <p:sldId id="261" r:id="rId8"/>
+    <p:sldId id="263" r:id="rId6"/>
+    <p:sldId id="259" r:id="rId7"/>
+    <p:sldId id="260" r:id="rId8"/>
+    <p:sldId id="261" r:id="rId9"/>
   </p:sldIdLst>
   <p:sldSz cx="9144000" cy="6858000" type="screen4x3"/>
   <p:notesSz cx="6858000" cy="9144000"/>
@@ -10454,7 +10455,7 @@
             </a:ln>
             <a:extLst>
               <a:ext uri="{91240B29-F687-4f45-9708-019B960494DF}">
-                <a14:hiddenLine xmlns="" xmlns:a14="http://schemas.microsoft.com/office/drawing/2010/main" w="9525">
+                <a14:hiddenLine xmlns:a14="http://schemas.microsoft.com/office/drawing/2010/main" xmlns="" w="9525">
                   <a:solidFill>
                     <a:srgbClr val="000000"/>
                   </a:solidFill>
@@ -11535,7 +11536,7 @@
             </a:ln>
             <a:extLst>
               <a:ext uri="{91240B29-F687-4f45-9708-019B960494DF}">
-                <a14:hiddenLine xmlns="" xmlns:a14="http://schemas.microsoft.com/office/drawing/2010/main" w="9525">
+                <a14:hiddenLine xmlns:a14="http://schemas.microsoft.com/office/drawing/2010/main" xmlns="" w="9525">
                   <a:solidFill>
                     <a:srgbClr val="000000"/>
                   </a:solidFill>
@@ -12621,7 +12622,7 @@
             </a:ln>
             <a:extLst>
               <a:ext uri="{91240B29-F687-4f45-9708-019B960494DF}">
-                <a14:hiddenLine xmlns="" xmlns:a14="http://schemas.microsoft.com/office/drawing/2010/main" w="9525">
+                <a14:hiddenLine xmlns:a14="http://schemas.microsoft.com/office/drawing/2010/main" xmlns="" w="9525">
                   <a:solidFill>
                     <a:srgbClr val="000000"/>
                   </a:solidFill>
@@ -13582,7 +13583,7 @@
             </a:ln>
             <a:extLst>
               <a:ext uri="{91240B29-F687-4f45-9708-019B960494DF}">
-                <a14:hiddenLine xmlns="" xmlns:a14="http://schemas.microsoft.com/office/drawing/2010/main" w="9525">
+                <a14:hiddenLine xmlns:a14="http://schemas.microsoft.com/office/drawing/2010/main" xmlns="" w="9525">
                   <a:solidFill>
                     <a:srgbClr val="000000"/>
                   </a:solidFill>
@@ -14697,7 +14698,7 @@
             </a:ln>
             <a:extLst>
               <a:ext uri="{91240B29-F687-4f45-9708-019B960494DF}">
-                <a14:hiddenLine xmlns="" xmlns:a14="http://schemas.microsoft.com/office/drawing/2010/main" w="9525">
+                <a14:hiddenLine xmlns:a14="http://schemas.microsoft.com/office/drawing/2010/main" xmlns="" w="9525">
                   <a:solidFill>
                     <a:srgbClr val="000000"/>
                   </a:solidFill>
@@ -17446,7 +17447,7 @@
           </a:ln>
           <a:extLst>
             <a:ext uri="{91240B29-F687-4f45-9708-019B960494DF}">
-              <a14:hiddenLine xmlns="" xmlns:a14="http://schemas.microsoft.com/office/drawing/2010/main" w="9525">
+              <a14:hiddenLine xmlns:a14="http://schemas.microsoft.com/office/drawing/2010/main" xmlns="" w="9525">
                 <a:solidFill>
                   <a:srgbClr val="000000"/>
                 </a:solidFill>
@@ -18621,7 +18622,7 @@
             </a:ln>
             <a:extLst>
               <a:ext uri="{91240B29-F687-4f45-9708-019B960494DF}">
-                <a14:hiddenLine xmlns="" xmlns:a14="http://schemas.microsoft.com/office/drawing/2010/main" w="9525">
+                <a14:hiddenLine xmlns:a14="http://schemas.microsoft.com/office/drawing/2010/main" xmlns="" w="9525">
                   <a:solidFill>
                     <a:srgbClr val="000000"/>
                   </a:solidFill>
@@ -20589,7 +20590,7 @@
             </a:ln>
             <a:extLst>
               <a:ext uri="{91240B29-F687-4f45-9708-019B960494DF}">
-                <a14:hiddenLine xmlns="" xmlns:a14="http://schemas.microsoft.com/office/drawing/2010/main" w="9525">
+                <a14:hiddenLine xmlns:a14="http://schemas.microsoft.com/office/drawing/2010/main" xmlns="" w="9525">
                   <a:solidFill>
                     <a:srgbClr val="000000"/>
                   </a:solidFill>
@@ -21647,7 +21648,7 @@
             </a:ln>
             <a:extLst>
               <a:ext uri="{91240B29-F687-4f45-9708-019B960494DF}">
-                <a14:hiddenLine xmlns="" xmlns:a14="http://schemas.microsoft.com/office/drawing/2010/main" w="9525">
+                <a14:hiddenLine xmlns:a14="http://schemas.microsoft.com/office/drawing/2010/main" xmlns="" w="9525">
                   <a:solidFill>
                     <a:srgbClr val="000000"/>
                   </a:solidFill>
@@ -22697,7 +22698,7 @@
             </a:ln>
             <a:extLst>
               <a:ext uri="{91240B29-F687-4f45-9708-019B960494DF}">
-                <a14:hiddenLine xmlns="" xmlns:a14="http://schemas.microsoft.com/office/drawing/2010/main" w="9525">
+                <a14:hiddenLine xmlns:a14="http://schemas.microsoft.com/office/drawing/2010/main" xmlns="" w="9525">
                   <a:solidFill>
                     <a:srgbClr val="000000"/>
                   </a:solidFill>
@@ -25284,6 +25285,386 @@
     <p:bg>
       <p:bgPr>
         <a:solidFill>
+          <a:schemeClr val="bg2"/>
+        </a:solidFill>
+        <a:effectLst/>
+      </p:bgPr>
+    </p:bg>
+    <p:spTree>
+      <p:nvGrpSpPr>
+        <p:cNvPr id="1" name="">
+          <a:extLst>
+            <a:ext uri="{FF2B5EF4-FFF2-40B4-BE49-F238E27FC236}">
+              <a16:creationId xmlns:a16="http://schemas.microsoft.com/office/drawing/2014/main" id="{23875B43-B2B0-5A0A-C09D-17C64CDB717D}"/>
+            </a:ext>
+          </a:extLst>
+        </p:cNvPr>
+        <p:cNvGrpSpPr/>
+        <p:nvPr/>
+      </p:nvGrpSpPr>
+      <p:grpSpPr>
+        <a:xfrm>
+          <a:off x="0" y="0"/>
+          <a:ext cx="0" cy="0"/>
+          <a:chOff x="0" y="0"/>
+          <a:chExt cx="0" cy="0"/>
+        </a:xfrm>
+      </p:grpSpPr>
+      <p:grpSp>
+        <p:nvGrpSpPr>
+          <p:cNvPr id="9" name="Group 8">
+            <a:extLst>
+              <a:ext uri="{FF2B5EF4-FFF2-40B4-BE49-F238E27FC236}">
+                <a16:creationId xmlns:a16="http://schemas.microsoft.com/office/drawing/2014/main" id="{7DCD05DD-290D-7D40-CD2F-1D28BF95DE61}"/>
+              </a:ext>
+              <a:ext uri="{C183D7F6-B498-43B3-948B-1728B52AA6E4}">
+                <adec:decorative xmlns:adec="http://schemas.microsoft.com/office/drawing/2017/decorative" val="1"/>
+              </a:ext>
+            </a:extLst>
+          </p:cNvPr>
+          <p:cNvGrpSpPr>
+            <a:grpSpLocks noGrp="1" noUngrp="1" noRot="1" noChangeAspect="1" noMove="1" noResize="1"/>
+          </p:cNvGrpSpPr>
+          <p:nvPr>
+            <p:extLst>
+              <p:ext uri="{386F3935-93C4-4BCD-93E2-E3B085C9AB24}">
+                <p16:designElem xmlns:p16="http://schemas.microsoft.com/office/powerpoint/2015/main" val="1"/>
+              </p:ext>
+            </p:extLst>
+          </p:nvPr>
+        </p:nvGrpSpPr>
+        <p:grpSpPr>
+          <a:xfrm>
+            <a:off x="0" y="0"/>
+            <a:ext cx="9144000" cy="6858000"/>
+            <a:chOff x="0" y="0"/>
+            <a:chExt cx="12192000" cy="6858000"/>
+          </a:xfrm>
+        </p:grpSpPr>
+        <p:sp>
+          <p:nvSpPr>
+            <p:cNvPr id="10" name="Rectangle 9">
+              <a:extLst>
+                <a:ext uri="{FF2B5EF4-FFF2-40B4-BE49-F238E27FC236}">
+                  <a16:creationId xmlns:a16="http://schemas.microsoft.com/office/drawing/2014/main" id="{B1CE25B1-DD52-16A1-CE71-E331150E6B01}"/>
+                </a:ext>
+                <a:ext uri="{C183D7F6-B498-43B3-948B-1728B52AA6E4}">
+                  <adec:decorative xmlns:adec="http://schemas.microsoft.com/office/drawing/2017/decorative" val="1"/>
+                </a:ext>
+              </a:extLst>
+            </p:cNvPr>
+            <p:cNvSpPr/>
+            <p:nvPr>
+              <p:extLst>
+                <p:ext uri="{386F3935-93C4-4BCD-93E2-E3B085C9AB24}">
+                  <p16:designElem xmlns:p16="http://schemas.microsoft.com/office/powerpoint/2015/main" val="1"/>
+                </p:ext>
+              </p:extLst>
+            </p:nvPr>
+          </p:nvSpPr>
+          <p:spPr>
+            <a:xfrm>
+              <a:off x="0" y="0"/>
+              <a:ext cx="12192000" cy="6858000"/>
+            </a:xfrm>
+            <a:prstGeom prst="rect">
+              <a:avLst/>
+            </a:prstGeom>
+            <a:blipFill>
+              <a:blip r:embed="rId2">
+                <a:duotone>
+                  <a:schemeClr val="dk2">
+                    <a:shade val="69000"/>
+                    <a:hueMod val="91000"/>
+                    <a:satMod val="164000"/>
+                    <a:lumMod val="74000"/>
+                  </a:schemeClr>
+                  <a:schemeClr val="dk2">
+                    <a:hueMod val="124000"/>
+                    <a:satMod val="140000"/>
+                    <a:lumMod val="142000"/>
+                  </a:schemeClr>
+                </a:duotone>
+              </a:blip>
+              <a:stretch>
+                <a:fillRect/>
+              </a:stretch>
+            </a:blipFill>
+            <a:ln>
+              <a:noFill/>
+            </a:ln>
+          </p:spPr>
+          <p:style>
+            <a:lnRef idx="2">
+              <a:schemeClr val="accent1">
+                <a:shade val="50000"/>
+              </a:schemeClr>
+            </a:lnRef>
+            <a:fillRef idx="1">
+              <a:schemeClr val="accent1"/>
+            </a:fillRef>
+            <a:effectRef idx="0">
+              <a:schemeClr val="accent1"/>
+            </a:effectRef>
+            <a:fontRef idx="minor">
+              <a:schemeClr val="lt1"/>
+            </a:fontRef>
+          </p:style>
+          <p:txBody>
+            <a:bodyPr/>
+            <a:lstStyle/>
+            <a:p>
+              <a:endParaRPr lang="en-US"/>
+            </a:p>
+          </p:txBody>
+        </p:sp>
+        <p:sp>
+          <p:nvSpPr>
+            <p:cNvPr id="11" name="Freeform 5">
+              <a:extLst>
+                <a:ext uri="{FF2B5EF4-FFF2-40B4-BE49-F238E27FC236}">
+                  <a16:creationId xmlns:a16="http://schemas.microsoft.com/office/drawing/2014/main" id="{E012CA3D-DE62-E84C-E49A-6839422606C5}"/>
+                </a:ext>
+                <a:ext uri="{C183D7F6-B498-43B3-948B-1728B52AA6E4}">
+                  <adec:decorative xmlns:adec="http://schemas.microsoft.com/office/drawing/2017/decorative" val="1"/>
+                </a:ext>
+              </a:extLst>
+            </p:cNvPr>
+            <p:cNvSpPr>
+              <a:spLocks noEditPoints="1"/>
+            </p:cNvSpPr>
+            <p:nvPr>
+              <p:extLst>
+                <p:ext uri="{386F3935-93C4-4BCD-93E2-E3B085C9AB24}">
+                  <p16:designElem xmlns:p16="http://schemas.microsoft.com/office/powerpoint/2015/main" val="1"/>
+                </p:ext>
+              </p:extLst>
+            </p:nvPr>
+          </p:nvSpPr>
+          <p:spPr bwMode="gray">
+            <a:xfrm>
+              <a:off x="0" y="1587"/>
+              <a:ext cx="12192000" cy="6856413"/>
+            </a:xfrm>
+            <a:custGeom>
+              <a:avLst/>
+              <a:gdLst/>
+              <a:ahLst/>
+              <a:cxnLst/>
+              <a:rect l="0" t="0" r="r" b="b"/>
+              <a:pathLst>
+                <a:path w="15356" h="8638">
+                  <a:moveTo>
+                    <a:pt x="0" y="0"/>
+                  </a:moveTo>
+                  <a:lnTo>
+                    <a:pt x="0" y="8638"/>
+                  </a:lnTo>
+                  <a:lnTo>
+                    <a:pt x="15356" y="8638"/>
+                  </a:lnTo>
+                  <a:lnTo>
+                    <a:pt x="15356" y="0"/>
+                  </a:lnTo>
+                  <a:lnTo>
+                    <a:pt x="0" y="0"/>
+                  </a:lnTo>
+                  <a:close/>
+                  <a:moveTo>
+                    <a:pt x="14748" y="8038"/>
+                  </a:moveTo>
+                  <a:lnTo>
+                    <a:pt x="600" y="8038"/>
+                  </a:lnTo>
+                  <a:lnTo>
+                    <a:pt x="600" y="592"/>
+                  </a:lnTo>
+                  <a:lnTo>
+                    <a:pt x="14748" y="592"/>
+                  </a:lnTo>
+                  <a:lnTo>
+                    <a:pt x="14748" y="8038"/>
+                  </a:lnTo>
+                  <a:close/>
+                </a:path>
+              </a:pathLst>
+            </a:custGeom>
+            <a:solidFill>
+              <a:srgbClr val="FFFFFF"/>
+            </a:solidFill>
+            <a:ln>
+              <a:noFill/>
+            </a:ln>
+          </p:spPr>
+          <p:txBody>
+            <a:bodyPr/>
+            <a:lstStyle/>
+            <a:p>
+              <a:endParaRPr lang="en-US"/>
+            </a:p>
+          </p:txBody>
+        </p:sp>
+      </p:grpSp>
+      <p:sp>
+        <p:nvSpPr>
+          <p:cNvPr id="2" name="Title 1">
+            <a:extLst>
+              <a:ext uri="{FF2B5EF4-FFF2-40B4-BE49-F238E27FC236}">
+                <a16:creationId xmlns:a16="http://schemas.microsoft.com/office/drawing/2014/main" id="{03AF2A75-A37C-01F8-96F6-2833507DEC7B}"/>
+              </a:ext>
+            </a:extLst>
+          </p:cNvPr>
+          <p:cNvSpPr>
+            <a:spLocks noGrp="1"/>
+          </p:cNvSpPr>
+          <p:nvPr>
+            <p:ph type="title"/>
+          </p:nvPr>
+        </p:nvSpPr>
+        <p:spPr>
+          <a:xfrm>
+            <a:off x="866215" y="973668"/>
+            <a:ext cx="6571060" cy="706964"/>
+          </a:xfrm>
+        </p:spPr>
+        <p:txBody>
+          <a:bodyPr>
+            <a:normAutofit fontScale="90000"/>
+          </a:bodyPr>
+          <a:lstStyle/>
+          <a:p>
+            <a:r>
+              <a:rPr lang="en-US" b="1" dirty="0">
+                <a:solidFill>
+                  <a:srgbClr val="FFFFFF"/>
+                </a:solidFill>
+              </a:rPr>
+              <a:t>Worldwide data</a:t>
+            </a:r>
+            <a:r>
+              <a:rPr lang="en-US" dirty="0">
+                <a:solidFill>
+                  <a:srgbClr val="FFFFFF"/>
+                </a:solidFill>
+              </a:rPr>
+              <a:t>: The higher the vax rate, the higher the cases</a:t>
+            </a:r>
+            <a:endParaRPr lang="en-US" b="1" dirty="0">
+              <a:solidFill>
+                <a:srgbClr val="FFFFFF"/>
+              </a:solidFill>
+            </a:endParaRPr>
+          </a:p>
+        </p:txBody>
+      </p:sp>
+      <p:sp>
+        <p:nvSpPr>
+          <p:cNvPr id="13" name="Rectangle 12">
+            <a:extLst>
+              <a:ext uri="{FF2B5EF4-FFF2-40B4-BE49-F238E27FC236}">
+                <a16:creationId xmlns:a16="http://schemas.microsoft.com/office/drawing/2014/main" id="{254C5321-CEA4-5A10-F64A-CD590BB79273}"/>
+              </a:ext>
+              <a:ext uri="{C183D7F6-B498-43B3-948B-1728B52AA6E4}">
+                <adec:decorative xmlns:adec="http://schemas.microsoft.com/office/drawing/2017/decorative" val="1"/>
+              </a:ext>
+            </a:extLst>
+          </p:cNvPr>
+          <p:cNvSpPr>
+            <a:spLocks noGrp="1" noRot="1" noChangeAspect="1" noMove="1" noResize="1" noEditPoints="1" noAdjustHandles="1" noChangeArrowheads="1" noChangeShapeType="1" noTextEdit="1"/>
+          </p:cNvSpPr>
+          <p:nvPr>
+            <p:extLst>
+              <p:ext uri="{386F3935-93C4-4BCD-93E2-E3B085C9AB24}">
+                <p16:designElem xmlns:p16="http://schemas.microsoft.com/office/powerpoint/2015/main" val="1"/>
+              </p:ext>
+            </p:extLst>
+          </p:nvPr>
+        </p:nvSpPr>
+        <p:spPr>
+          <a:xfrm>
+            <a:off x="7828359" y="0"/>
+            <a:ext cx="514350" cy="1143000"/>
+          </a:xfrm>
+          <a:prstGeom prst="rect">
+            <a:avLst/>
+          </a:prstGeom>
+          <a:solidFill>
+            <a:schemeClr val="accent1"/>
+          </a:solidFill>
+          <a:ln>
+            <a:noFill/>
+          </a:ln>
+        </p:spPr>
+        <p:style>
+          <a:lnRef idx="1">
+            <a:schemeClr val="accent1"/>
+          </a:lnRef>
+          <a:fillRef idx="3">
+            <a:schemeClr val="accent1"/>
+          </a:fillRef>
+          <a:effectRef idx="2">
+            <a:schemeClr val="accent1"/>
+          </a:effectRef>
+          <a:fontRef idx="minor">
+            <a:schemeClr val="lt1"/>
+          </a:fontRef>
+        </p:style>
+        <p:txBody>
+          <a:bodyPr/>
+          <a:lstStyle/>
+          <a:p>
+            <a:endParaRPr lang="en-US"/>
+          </a:p>
+        </p:txBody>
+      </p:sp>
+      <p:pic>
+        <p:nvPicPr>
+          <p:cNvPr id="4" name="Picture 3">
+            <a:extLst>
+              <a:ext uri="{FF2B5EF4-FFF2-40B4-BE49-F238E27FC236}">
+                <a16:creationId xmlns:a16="http://schemas.microsoft.com/office/drawing/2014/main" id="{4C47F4DB-704B-F798-86ED-A21B10766CD5}"/>
+              </a:ext>
+            </a:extLst>
+          </p:cNvPr>
+          <p:cNvPicPr>
+            <a:picLocks noChangeAspect="1"/>
+          </p:cNvPicPr>
+          <p:nvPr/>
+        </p:nvPicPr>
+        <p:blipFill>
+          <a:blip r:embed="rId3"/>
+          <a:srcRect r="-1057" b="13575"/>
+          <a:stretch/>
+        </p:blipFill>
+        <p:spPr>
+          <a:xfrm>
+            <a:off x="1227914" y="1841227"/>
+            <a:ext cx="6891957" cy="4486422"/>
+          </a:xfrm>
+          <a:prstGeom prst="rect">
+            <a:avLst/>
+          </a:prstGeom>
+        </p:spPr>
+      </p:pic>
+    </p:spTree>
+    <p:extLst>
+      <p:ext uri="{BB962C8B-B14F-4D97-AF65-F5344CB8AC3E}">
+        <p14:creationId xmlns:p14="http://schemas.microsoft.com/office/powerpoint/2010/main" val="1338703705"/>
+      </p:ext>
+    </p:extLst>
+  </p:cSld>
+  <p:clrMapOvr>
+    <a:overrideClrMapping bg1="dk1" tx1="lt1" bg2="dk2" tx2="lt2" accent1="accent1" accent2="accent2" accent3="accent3" accent4="accent4" accent5="accent5" accent6="accent6" hlink="hlink" folHlink="folHlink"/>
+  </p:clrMapOvr>
+</p:sld>
+</file>
+
+<file path=ppt/slides/slide6.xml><?xml version="1.0" encoding="utf-8"?>
+<p:sld xmlns:a="http://schemas.openxmlformats.org/drawingml/2006/main" xmlns:r="http://schemas.openxmlformats.org/officeDocument/2006/relationships" xmlns:p="http://schemas.openxmlformats.org/presentationml/2006/main">
+  <p:cSld>
+    <p:bg>
+      <p:bgPr>
+        <a:solidFill>
           <a:schemeClr val="bg1"/>
         </a:solidFill>
         <a:effectLst/>
@@ -26222,7 +26603,7 @@
 </p:sld>
 </file>
 
-<file path=ppt/slides/slide6.xml><?xml version="1.0" encoding="utf-8"?>
+<file path=ppt/slides/slide7.xml><?xml version="1.0" encoding="utf-8"?>
 <p:sld xmlns:a="http://schemas.openxmlformats.org/drawingml/2006/main" xmlns:r="http://schemas.openxmlformats.org/officeDocument/2006/relationships" xmlns:p="http://schemas.openxmlformats.org/presentationml/2006/main">
   <p:cSld>
     <p:bg>
@@ -27277,7 +27658,7 @@
 </p:sld>
 </file>
 
-<file path=ppt/slides/slide7.xml><?xml version="1.0" encoding="utf-8"?>
+<file path=ppt/slides/slide8.xml><?xml version="1.0" encoding="utf-8"?>
 <p:sld xmlns:a="http://schemas.openxmlformats.org/drawingml/2006/main" xmlns:r="http://schemas.openxmlformats.org/officeDocument/2006/relationships" xmlns:p="http://schemas.openxmlformats.org/presentationml/2006/main">
   <p:cSld>
     <p:bg>

</xml_diff>